<commit_message>
update README.md update Pitchslide.pptx add highscore cookie
</commit_message>
<xml_diff>
--- a/Pitchslide.pptx
+++ b/Pitchslide.pptx
@@ -197,7 +197,7 @@
           <a:p>
             <a:fld id="{C97E2443-F335-CE4C-9EFB-C929EED8D58B}" type="datetimeFigureOut">
               <a:rPr lang="de-DE" smtClean="0"/>
-              <a:t>16.06.23</a:t>
+              <a:t>19.06.23</a:t>
             </a:fld>
             <a:endParaRPr lang="de-DE"/>
           </a:p>
@@ -695,7 +695,7 @@
           <a:p>
             <a:fld id="{78794161-22B7-A94C-8D62-2F75F1BD5FDD}" type="datetimeFigureOut">
               <a:rPr lang="de-DE" smtClean="0"/>
-              <a:t>16.06.23</a:t>
+              <a:t>19.06.23</a:t>
             </a:fld>
             <a:endParaRPr lang="de-DE"/>
           </a:p>
@@ -893,7 +893,7 @@
           <a:p>
             <a:fld id="{78794161-22B7-A94C-8D62-2F75F1BD5FDD}" type="datetimeFigureOut">
               <a:rPr lang="de-DE" smtClean="0"/>
-              <a:t>16.06.23</a:t>
+              <a:t>19.06.23</a:t>
             </a:fld>
             <a:endParaRPr lang="de-DE"/>
           </a:p>
@@ -1101,7 +1101,7 @@
           <a:p>
             <a:fld id="{78794161-22B7-A94C-8D62-2F75F1BD5FDD}" type="datetimeFigureOut">
               <a:rPr lang="de-DE" smtClean="0"/>
-              <a:t>16.06.23</a:t>
+              <a:t>19.06.23</a:t>
             </a:fld>
             <a:endParaRPr lang="de-DE"/>
           </a:p>
@@ -1299,7 +1299,7 @@
           <a:p>
             <a:fld id="{78794161-22B7-A94C-8D62-2F75F1BD5FDD}" type="datetimeFigureOut">
               <a:rPr lang="de-DE" smtClean="0"/>
-              <a:t>16.06.23</a:t>
+              <a:t>19.06.23</a:t>
             </a:fld>
             <a:endParaRPr lang="de-DE"/>
           </a:p>
@@ -1574,7 +1574,7 @@
           <a:p>
             <a:fld id="{78794161-22B7-A94C-8D62-2F75F1BD5FDD}" type="datetimeFigureOut">
               <a:rPr lang="de-DE" smtClean="0"/>
-              <a:t>16.06.23</a:t>
+              <a:t>19.06.23</a:t>
             </a:fld>
             <a:endParaRPr lang="de-DE"/>
           </a:p>
@@ -1839,7 +1839,7 @@
           <a:p>
             <a:fld id="{78794161-22B7-A94C-8D62-2F75F1BD5FDD}" type="datetimeFigureOut">
               <a:rPr lang="de-DE" smtClean="0"/>
-              <a:t>16.06.23</a:t>
+              <a:t>19.06.23</a:t>
             </a:fld>
             <a:endParaRPr lang="de-DE"/>
           </a:p>
@@ -2251,7 +2251,7 @@
           <a:p>
             <a:fld id="{78794161-22B7-A94C-8D62-2F75F1BD5FDD}" type="datetimeFigureOut">
               <a:rPr lang="de-DE" smtClean="0"/>
-              <a:t>16.06.23</a:t>
+              <a:t>19.06.23</a:t>
             </a:fld>
             <a:endParaRPr lang="de-DE"/>
           </a:p>
@@ -2392,7 +2392,7 @@
           <a:p>
             <a:fld id="{78794161-22B7-A94C-8D62-2F75F1BD5FDD}" type="datetimeFigureOut">
               <a:rPr lang="de-DE" smtClean="0"/>
-              <a:t>16.06.23</a:t>
+              <a:t>19.06.23</a:t>
             </a:fld>
             <a:endParaRPr lang="de-DE"/>
           </a:p>
@@ -2505,7 +2505,7 @@
           <a:p>
             <a:fld id="{78794161-22B7-A94C-8D62-2F75F1BD5FDD}" type="datetimeFigureOut">
               <a:rPr lang="de-DE" smtClean="0"/>
-              <a:t>16.06.23</a:t>
+              <a:t>19.06.23</a:t>
             </a:fld>
             <a:endParaRPr lang="de-DE"/>
           </a:p>
@@ -2816,7 +2816,7 @@
           <a:p>
             <a:fld id="{78794161-22B7-A94C-8D62-2F75F1BD5FDD}" type="datetimeFigureOut">
               <a:rPr lang="de-DE" smtClean="0"/>
-              <a:t>16.06.23</a:t>
+              <a:t>19.06.23</a:t>
             </a:fld>
             <a:endParaRPr lang="de-DE"/>
           </a:p>
@@ -3104,7 +3104,7 @@
           <a:p>
             <a:fld id="{78794161-22B7-A94C-8D62-2F75F1BD5FDD}" type="datetimeFigureOut">
               <a:rPr lang="de-DE" smtClean="0"/>
-              <a:t>16.06.23</a:t>
+              <a:t>19.06.23</a:t>
             </a:fld>
             <a:endParaRPr lang="de-DE"/>
           </a:p>
@@ -3345,7 +3345,7 @@
           <a:p>
             <a:fld id="{78794161-22B7-A94C-8D62-2F75F1BD5FDD}" type="datetimeFigureOut">
               <a:rPr lang="de-DE" smtClean="0"/>
-              <a:t>16.06.23</a:t>
+              <a:t>19.06.23</a:t>
             </a:fld>
             <a:endParaRPr lang="de-DE"/>
           </a:p>
@@ -4422,20 +4422,14 @@
             </a:r>
           </a:p>
           <a:p>
-            <a:pPr marL="285750" indent="-285750" algn="ctr">
-              <a:buFont typeface="Arial" panose="020B0604020202020204" pitchFamily="34" charset="0"/>
-              <a:buChar char="•"/>
-            </a:pPr>
+            <a:pPr algn="ctr"/>
             <a:r>
               <a:rPr lang="de-DE" dirty="0"/>
               <a:t>Tastatur</a:t>
             </a:r>
           </a:p>
           <a:p>
-            <a:pPr marL="285750" indent="-285750" algn="ctr">
-              <a:buFont typeface="Arial" panose="020B0604020202020204" pitchFamily="34" charset="0"/>
-              <a:buChar char="•"/>
-            </a:pPr>
+            <a:pPr algn="ctr"/>
             <a:r>
               <a:rPr lang="de-DE" dirty="0"/>
               <a:t>Touch / Maus</a:t>
@@ -4456,10 +4450,7 @@
             </a:r>
           </a:p>
           <a:p>
-            <a:pPr marL="285750" indent="-285750" algn="ctr">
-              <a:buFont typeface="Arial" panose="020B0604020202020204" pitchFamily="34" charset="0"/>
-              <a:buChar char="•"/>
-            </a:pPr>
+            <a:pPr algn="ctr"/>
             <a:r>
               <a:rPr lang="de-DE" dirty="0"/>
               <a:t>Basierend</a:t>
@@ -4479,10 +4470,7 @@
             <a:endParaRPr lang="de-DE" dirty="0"/>
           </a:p>
           <a:p>
-            <a:pPr marL="285750" indent="-285750" algn="ctr">
-              <a:buFont typeface="Arial" panose="020B0604020202020204" pitchFamily="34" charset="0"/>
-              <a:buChar char="•"/>
-            </a:pPr>
+            <a:pPr algn="ctr"/>
             <a:r>
               <a:rPr lang="de-DE" dirty="0" err="1"/>
               <a:t>Deployment</a:t>
@@ -4508,20 +4496,14 @@
             </a:r>
           </a:p>
           <a:p>
-            <a:pPr marL="285750" indent="-285750" algn="ctr">
-              <a:buFont typeface="Arial" panose="020B0604020202020204" pitchFamily="34" charset="0"/>
-              <a:buChar char="•"/>
-            </a:pPr>
+            <a:pPr algn="ctr"/>
             <a:r>
               <a:rPr lang="de-DE" dirty="0"/>
               <a:t>Normal</a:t>
             </a:r>
           </a:p>
           <a:p>
-            <a:pPr marL="285750" indent="-285750" algn="ctr">
-              <a:buFont typeface="Arial" panose="020B0604020202020204" pitchFamily="34" charset="0"/>
-              <a:buChar char="•"/>
-            </a:pPr>
+            <a:pPr algn="ctr"/>
             <a:r>
               <a:rPr lang="de-DE" dirty="0"/>
               <a:t>Schwer</a:t>
@@ -4542,20 +4524,14 @@
             </a:r>
           </a:p>
           <a:p>
-            <a:pPr marL="285750" indent="-285750" algn="ctr">
-              <a:buFont typeface="Arial" panose="020B0604020202020204" pitchFamily="34" charset="0"/>
-              <a:buChar char="•"/>
-            </a:pPr>
+            <a:pPr algn="ctr"/>
             <a:r>
               <a:rPr lang="de-DE" dirty="0"/>
               <a:t>Musik</a:t>
             </a:r>
           </a:p>
           <a:p>
-            <a:pPr marL="285750" indent="-285750" algn="ctr">
-              <a:buFont typeface="Arial" panose="020B0604020202020204" pitchFamily="34" charset="0"/>
-              <a:buChar char="•"/>
-            </a:pPr>
+            <a:pPr algn="ctr"/>
             <a:r>
               <a:rPr lang="de-DE" dirty="0"/>
               <a:t>Soundeffekte</a:t>

</xml_diff>